<commit_message>
Final Present DONEgit add docs/Kitchen\ Safety\ Guide.pptxgit add docs/Kitchen\ Safety\ Guide.pptx
</commit_message>
<xml_diff>
--- a/docs/Kitchen Safety Guide.pptx
+++ b/docs/Kitchen Safety Guide.pptx
@@ -5,7 +5,7 @@
     <p:sldMasterId id="2147483659" r:id="rId1"/>
   </p:sldMasterIdLst>
   <p:notesMasterIdLst>
-    <p:notesMasterId r:id="rId25"/>
+    <p:notesMasterId r:id="rId26"/>
   </p:notesMasterIdLst>
   <p:sldIdLst>
     <p:sldId id="256" r:id="rId2"/>
@@ -28,26 +28,27 @@
     <p:sldId id="278" r:id="rId19"/>
     <p:sldId id="272" r:id="rId20"/>
     <p:sldId id="273" r:id="rId21"/>
-    <p:sldId id="275" r:id="rId22"/>
-    <p:sldId id="276" r:id="rId23"/>
-    <p:sldId id="277" r:id="rId24"/>
+    <p:sldId id="281" r:id="rId22"/>
+    <p:sldId id="275" r:id="rId23"/>
+    <p:sldId id="276" r:id="rId24"/>
+    <p:sldId id="277" r:id="rId25"/>
   </p:sldIdLst>
   <p:sldSz cx="9144000" cy="5143500" type="screen16x9"/>
   <p:notesSz cx="6858000" cy="9144000"/>
   <p:embeddedFontLst>
     <p:embeddedFont>
       <p:font typeface="Calibri" panose="020F0502020204030204" pitchFamily="34" charset="0"/>
-      <p:regular r:id="rId26"/>
-      <p:bold r:id="rId27"/>
-      <p:italic r:id="rId28"/>
-      <p:boldItalic r:id="rId29"/>
+      <p:regular r:id="rId27"/>
+      <p:bold r:id="rId28"/>
+      <p:italic r:id="rId29"/>
+      <p:boldItalic r:id="rId30"/>
     </p:embeddedFont>
     <p:embeddedFont>
-      <p:font typeface="Roboto" panose="020B0604020202020204" charset="0"/>
-      <p:regular r:id="rId30"/>
-      <p:bold r:id="rId31"/>
-      <p:italic r:id="rId32"/>
-      <p:boldItalic r:id="rId33"/>
+      <p:font typeface="Roboto" panose="02000000000000000000" pitchFamily="2" charset="0"/>
+      <p:regular r:id="rId31"/>
+      <p:bold r:id="rId32"/>
+      <p:italic r:id="rId33"/>
+      <p:boldItalic r:id="rId34"/>
     </p:embeddedFont>
   </p:embeddedFontLst>
   <p:defaultTextStyle>
@@ -11523,10 +11524,10 @@
               <a:buNone/>
             </a:pPr>
             <a:r>
-              <a:rPr lang="zh-TW"/>
+              <a:rPr lang="zh-TW" dirty="0"/>
               <a:t>Unattended Cooking Algorithm</a:t>
             </a:r>
-            <a:endParaRPr/>
+            <a:endParaRPr dirty="0"/>
           </a:p>
         </p:txBody>
       </p:sp>
@@ -11561,15 +11562,15 @@
               </a:lnSpc>
             </a:pPr>
             <a:r>
-              <a:rPr lang="zh-TW" b="1"/>
+              <a:rPr lang="zh-TW" b="1" dirty="0"/>
               <a:t>Version 2:</a:t>
             </a:r>
             <a:r>
-              <a:rPr lang="zh-TW"/>
+              <a:rPr lang="zh-TW" dirty="0"/>
               <a:t> real-time weighted score</a:t>
             </a:r>
             <a:r>
-              <a:rPr lang="zh-TW" altLang="en-US"/>
+              <a:rPr lang="zh-TW" altLang="en-US" dirty="0"/>
               <a:t> </a:t>
             </a:r>
           </a:p>
@@ -11588,10 +11589,10 @@
               <a:buChar char="○"/>
             </a:pPr>
             <a:r>
-              <a:rPr lang="zh-TW"/>
+              <a:rPr lang="zh-TW" dirty="0"/>
               <a:t>e.g. currentScore = (fire * 2 + hand * 0.75 + human * 1 + pot * 1.2) </a:t>
             </a:r>
-            <a:endParaRPr/>
+            <a:endParaRPr dirty="0"/>
           </a:p>
           <a:p>
             <a:pPr>
@@ -11600,15 +11601,15 @@
               </a:lnSpc>
             </a:pPr>
             <a:r>
-              <a:rPr lang="zh-TW" b="1"/>
+              <a:rPr lang="zh-TW" b="1" dirty="0"/>
               <a:t>Version 3:</a:t>
             </a:r>
             <a:r>
-              <a:rPr lang="zh-TW"/>
+              <a:rPr lang="zh-TW" dirty="0"/>
               <a:t> forgetful weighted score</a:t>
             </a:r>
             <a:r>
-              <a:rPr lang="zh-TW" altLang="en-US"/>
+              <a:rPr lang="zh-TW" altLang="en-US" dirty="0"/>
               <a:t> </a:t>
             </a:r>
           </a:p>
@@ -11627,10 +11628,18 @@
               <a:buChar char="○"/>
             </a:pPr>
             <a:r>
-              <a:rPr lang="zh-TW"/>
-              <a:t>e.g. currentScore = currentScore * 0.5 + (fire * 4 + hand * 0.75 + human * 1 + pot * 1.2)</a:t>
-            </a:r>
-            <a:endParaRPr/>
+              <a:rPr lang="zh-TW" dirty="0"/>
+              <a:t>e.g. currentScore = </a:t>
+            </a:r>
+            <a:r>
+              <a:rPr lang="en-US" altLang="zh-TW" dirty="0"/>
+              <a:t>past</a:t>
+            </a:r>
+            <a:r>
+              <a:rPr lang="zh-TW" dirty="0"/>
+              <a:t>Score * 0.5 + (fire * 4 + hand * 0.75 + human * 1 + pot * 1.2)</a:t>
+            </a:r>
+            <a:endParaRPr dirty="0"/>
           </a:p>
           <a:p>
             <a:pPr marL="457200" lvl="0" indent="-342900" algn="l" rtl="0">
@@ -11647,14 +11656,14 @@
               <a:buChar char="●"/>
             </a:pPr>
             <a:r>
-              <a:rPr lang="zh-TW" b="1"/>
+              <a:rPr lang="zh-TW" b="1" dirty="0"/>
               <a:t>Version 4:</a:t>
             </a:r>
             <a:r>
-              <a:rPr lang="zh-TW"/>
+              <a:rPr lang="zh-TW" dirty="0"/>
               <a:t> “forgetful” weighted score with negative weights</a:t>
             </a:r>
-            <a:endParaRPr/>
+            <a:endParaRPr dirty="0"/>
           </a:p>
         </p:txBody>
       </p:sp>
@@ -13000,6 +13009,91 @@
 </file>
 
 <file path=ppt/slides/slide21.xml><?xml version="1.0" encoding="utf-8"?>
+<p:sld xmlns:a="http://schemas.openxmlformats.org/drawingml/2006/main" xmlns:r="http://schemas.openxmlformats.org/officeDocument/2006/relationships" xmlns:p="http://schemas.openxmlformats.org/presentationml/2006/main">
+  <p:cSld>
+    <p:spTree>
+      <p:nvGrpSpPr>
+        <p:cNvPr id="1" name=""/>
+        <p:cNvGrpSpPr/>
+        <p:nvPr/>
+      </p:nvGrpSpPr>
+      <p:grpSpPr>
+        <a:xfrm>
+          <a:off x="0" y="0"/>
+          <a:ext cx="0" cy="0"/>
+          <a:chOff x="0" y="0"/>
+          <a:chExt cx="0" cy="0"/>
+        </a:xfrm>
+      </p:grpSpPr>
+      <p:sp>
+        <p:nvSpPr>
+          <p:cNvPr id="2" name="Title 1">
+            <a:extLst>
+              <a:ext uri="{FF2B5EF4-FFF2-40B4-BE49-F238E27FC236}">
+                <a16:creationId xmlns:a16="http://schemas.microsoft.com/office/drawing/2014/main" id="{25B78EA7-3B2C-8B4E-A05B-3C288DF03B3F}"/>
+              </a:ext>
+            </a:extLst>
+          </p:cNvPr>
+          <p:cNvSpPr>
+            <a:spLocks noGrp="1"/>
+          </p:cNvSpPr>
+          <p:nvPr>
+            <p:ph type="title"/>
+          </p:nvPr>
+        </p:nvSpPr>
+        <p:spPr/>
+        <p:txBody>
+          <a:bodyPr>
+            <a:normAutofit fontScale="90000"/>
+          </a:bodyPr>
+          <a:lstStyle/>
+          <a:p>
+            <a:r>
+              <a:rPr lang="en-US" dirty="0"/>
+              <a:t>Live Demonstration</a:t>
+            </a:r>
+          </a:p>
+        </p:txBody>
+      </p:sp>
+      <p:sp>
+        <p:nvSpPr>
+          <p:cNvPr id="3" name="Text Placeholder 2">
+            <a:extLst>
+              <a:ext uri="{FF2B5EF4-FFF2-40B4-BE49-F238E27FC236}">
+                <a16:creationId xmlns:a16="http://schemas.microsoft.com/office/drawing/2014/main" id="{CC9D5B60-2FB3-6249-849A-A708DDE1300C}"/>
+              </a:ext>
+            </a:extLst>
+          </p:cNvPr>
+          <p:cNvSpPr>
+            <a:spLocks noGrp="1"/>
+          </p:cNvSpPr>
+          <p:nvPr>
+            <p:ph type="body" idx="1"/>
+          </p:nvPr>
+        </p:nvSpPr>
+        <p:spPr/>
+        <p:txBody>
+          <a:bodyPr/>
+          <a:lstStyle/>
+          <a:p>
+            <a:endParaRPr lang="en-US" dirty="0"/>
+          </a:p>
+        </p:txBody>
+      </p:sp>
+    </p:spTree>
+    <p:extLst>
+      <p:ext uri="{BB962C8B-B14F-4D97-AF65-F5344CB8AC3E}">
+        <p14:creationId xmlns:p14="http://schemas.microsoft.com/office/powerpoint/2010/main" val="2344563959"/>
+      </p:ext>
+    </p:extLst>
+  </p:cSld>
+  <p:clrMapOvr>
+    <a:masterClrMapping/>
+  </p:clrMapOvr>
+</p:sld>
+</file>
+
+<file path=ppt/slides/slide22.xml><?xml version="1.0" encoding="utf-8"?>
 <p:sld xmlns:a="http://schemas.openxmlformats.org/drawingml/2006/main" xmlns:r="http://schemas.openxmlformats.org/officeDocument/2006/relationships" xmlns:p="http://schemas.openxmlformats.org/presentationml/2006/main" show="0">
   <p:cSld>
     <p:spTree>
@@ -13104,7 +13198,7 @@
 </p:sld>
 </file>
 
-<file path=ppt/slides/slide22.xml><?xml version="1.0" encoding="utf-8"?>
+<file path=ppt/slides/slide23.xml><?xml version="1.0" encoding="utf-8"?>
 <p:sld xmlns:a="http://schemas.openxmlformats.org/drawingml/2006/main" xmlns:r="http://schemas.openxmlformats.org/officeDocument/2006/relationships" xmlns:p="http://schemas.openxmlformats.org/presentationml/2006/main" show="0">
   <p:cSld>
     <p:spTree>
@@ -13277,7 +13371,7 @@
 </p:sld>
 </file>
 
-<file path=ppt/slides/slide23.xml><?xml version="1.0" encoding="utf-8"?>
+<file path=ppt/slides/slide24.xml><?xml version="1.0" encoding="utf-8"?>
 <p:sld xmlns:a="http://schemas.openxmlformats.org/drawingml/2006/main" xmlns:r="http://schemas.openxmlformats.org/officeDocument/2006/relationships" xmlns:p="http://schemas.openxmlformats.org/presentationml/2006/main" show="0">
   <p:cSld>
     <p:spTree>
@@ -14033,14 +14127,22 @@
               <a:buNone/>
             </a:pPr>
             <a:r>
+              <a:rPr lang="en-US" altLang="zh-TW" sz="1600" b="1"/>
+              <a:t>I</a:t>
+            </a:r>
+            <a:r>
               <a:rPr lang="zh-TW" sz="1600" b="1"/>
-              <a:t>Data input: </a:t>
-            </a:r>
-            <a:r>
-              <a:rPr lang="zh-TW" sz="1600"/>
+              <a:t>nput</a:t>
+            </a:r>
+            <a:r>
+              <a:rPr lang="zh-TW" sz="1600" b="1" dirty="0"/>
+              <a:t>: </a:t>
+            </a:r>
+            <a:r>
+              <a:rPr lang="zh-TW" sz="1600" dirty="0"/>
               <a:t>NumPy array from MIPI RGB camera</a:t>
             </a:r>
-            <a:endParaRPr sz="1600"/>
+            <a:endParaRPr sz="1600" dirty="0"/>
           </a:p>
           <a:p>
             <a:pPr marL="0" indent="0">
@@ -14053,14 +14155,14 @@
               <a:buNone/>
             </a:pPr>
             <a:r>
-              <a:rPr lang="en-US" altLang="zh-TW" sz="1600" b="1"/>
+              <a:rPr lang="en-US" altLang="zh-TW" sz="1600" b="1" dirty="0"/>
               <a:t>Pre-process:</a:t>
             </a:r>
             <a:r>
-              <a:rPr lang="en-US" altLang="zh-TW" sz="1600"/>
+              <a:rPr lang="en-US" altLang="zh-TW" sz="1600" dirty="0"/>
               <a:t> </a:t>
             </a:r>
-            <a:endParaRPr lang="en-US" sz="1600"/>
+            <a:endParaRPr lang="en-US" sz="1600" dirty="0"/>
           </a:p>
           <a:p>
             <a:pPr indent="-330200">
@@ -14074,18 +14176,18 @@
               <a:buChar char="-"/>
             </a:pPr>
             <a:r>
-              <a:rPr lang="zh-TW" sz="1600"/>
+              <a:rPr lang="zh-TW" sz="1600" dirty="0"/>
               <a:t>Resize</a:t>
             </a:r>
             <a:r>
-              <a:rPr lang="en-US" altLang="zh-TW" sz="1600"/>
+              <a:rPr lang="en-US" altLang="zh-TW" sz="1600" dirty="0"/>
               <a:t>, </a:t>
             </a:r>
             <a:r>
-              <a:rPr lang="zh-TW" sz="1600"/>
+              <a:rPr lang="zh-TW" sz="1600" dirty="0"/>
               <a:t>brightness, contrast and normalization</a:t>
             </a:r>
-            <a:endParaRPr sz="1600"/>
+            <a:endParaRPr sz="1600" dirty="0"/>
           </a:p>
           <a:p>
             <a:pPr marL="0" lvl="0" indent="0" algn="l" rtl="0">
@@ -14101,14 +14203,14 @@
               <a:buNone/>
             </a:pPr>
             <a:r>
-              <a:rPr lang="zh-TW" sz="1600" b="1"/>
+              <a:rPr lang="zh-TW" sz="1600" b="1" dirty="0"/>
               <a:t>Inference:</a:t>
             </a:r>
             <a:r>
-              <a:rPr lang="zh-TW" sz="1600"/>
+              <a:rPr lang="zh-TW" sz="1600" dirty="0"/>
               <a:t> A custom AI YOLOv5 model for individually detecting fire, human, hand and pot</a:t>
             </a:r>
-            <a:endParaRPr sz="1600"/>
+            <a:endParaRPr sz="1600" dirty="0"/>
           </a:p>
           <a:p>
             <a:pPr marL="0" lvl="0" indent="0" algn="l" rtl="0">
@@ -14124,22 +14226,22 @@
               <a:buNone/>
             </a:pPr>
             <a:r>
-              <a:rPr lang="zh-TW" sz="1600" b="1"/>
+              <a:rPr lang="zh-TW" sz="1600" b="1" dirty="0"/>
               <a:t>Algorithm: </a:t>
             </a:r>
             <a:r>
-              <a:rPr lang="zh-TW" sz="1600"/>
+              <a:rPr lang="zh-TW" sz="1600" dirty="0"/>
               <a:t>A danger score determine</a:t>
             </a:r>
             <a:r>
-              <a:rPr lang="en-US" altLang="zh-TW" sz="1600"/>
+              <a:rPr lang="en-US" altLang="zh-TW" sz="1600" dirty="0"/>
               <a:t>d</a:t>
             </a:r>
             <a:r>
-              <a:rPr lang="zh-TW" sz="1600"/>
+              <a:rPr lang="zh-TW" sz="1600" dirty="0"/>
               <a:t> by the existence of each object</a:t>
             </a:r>
-            <a:endParaRPr sz="1600"/>
+            <a:endParaRPr sz="1600" dirty="0"/>
           </a:p>
           <a:p>
             <a:pPr marL="0" indent="0">
@@ -14155,14 +14257,14 @@
               <a:buNone/>
             </a:pPr>
             <a:r>
-              <a:rPr lang="zh-TW" sz="1600" b="1"/>
+              <a:rPr lang="zh-TW" sz="1600" b="1" dirty="0"/>
               <a:t>Output:</a:t>
             </a:r>
             <a:r>
-              <a:rPr lang="zh-TW" altLang="en-US" sz="1600"/>
+              <a:rPr lang="zh-TW" altLang="en-US" sz="1600" dirty="0"/>
               <a:t> audio output (optional video display)</a:t>
             </a:r>
-            <a:endParaRPr sz="1600"/>
+            <a:endParaRPr sz="1600" dirty="0"/>
           </a:p>
         </p:txBody>
       </p:sp>
@@ -14502,22 +14604,22 @@
               <a:buChar char="-"/>
             </a:pPr>
             <a:r>
-              <a:rPr lang="en-US" altLang="zh-TW"/>
+              <a:rPr lang="en-US" altLang="zh-TW" dirty="0"/>
               <a:t>Using </a:t>
             </a:r>
             <a:r>
-              <a:rPr lang="en-US" altLang="zh-TW" b="1"/>
+              <a:rPr lang="en-US" altLang="zh-TW" b="1" dirty="0"/>
               <a:t>YOLOv5 </a:t>
             </a:r>
             <a:r>
-              <a:rPr lang="en-US" altLang="zh-TW" b="1" err="1"/>
+              <a:rPr lang="en-US" altLang="zh-TW" b="1" dirty="0" err="1"/>
               <a:t>Github</a:t>
             </a:r>
             <a:r>
-              <a:rPr lang="en-US" altLang="zh-TW" b="1"/>
+              <a:rPr lang="en-US" altLang="zh-TW" b="1" dirty="0"/>
               <a:t> Repository</a:t>
             </a:r>
-            <a:endParaRPr lang="en-US" b="1"/>
+            <a:endParaRPr lang="en-US" b="1" dirty="0"/>
           </a:p>
           <a:p>
             <a:pPr marL="0" lvl="0" indent="0" algn="l" rtl="0">
@@ -14532,7 +14634,7 @@
               </a:spcAft>
               <a:buNone/>
             </a:pPr>
-            <a:endParaRPr/>
+            <a:endParaRPr dirty="0"/>
           </a:p>
           <a:p>
             <a:pPr>
@@ -14545,38 +14647,38 @@
               <a:buChar char="-"/>
             </a:pPr>
             <a:r>
-              <a:rPr lang="en-US" altLang="zh-TW"/>
-              <a:t>Create c</a:t>
-            </a:r>
-            <a:r>
-              <a:rPr lang="en-US"/>
+              <a:rPr lang="en-US" altLang="zh-TW" dirty="0"/>
+              <a:t>Creating c</a:t>
+            </a:r>
+            <a:r>
+              <a:rPr lang="en-US" dirty="0"/>
               <a:t>ustomized</a:t>
             </a:r>
             <a:r>
-              <a:rPr lang="en-US" altLang="zh-TW"/>
+              <a:rPr lang="en-US" altLang="zh-TW" dirty="0"/>
               <a:t> </a:t>
             </a:r>
             <a:r>
-              <a:rPr lang="en-US" altLang="zh-TW" b="1"/>
+              <a:rPr lang="en-US" altLang="zh-TW" b="1" dirty="0"/>
               <a:t>d</a:t>
             </a:r>
             <a:r>
-              <a:rPr lang="zh-TW" b="1"/>
+              <a:rPr lang="zh-TW" b="1" dirty="0"/>
               <a:t>a</a:t>
             </a:r>
             <a:r>
-              <a:rPr lang="en-US" altLang="zh-TW" b="1"/>
+              <a:rPr lang="en-US" altLang="zh-TW" b="1" dirty="0"/>
               <a:t>t</a:t>
             </a:r>
             <a:r>
-              <a:rPr lang="zh-TW" b="1"/>
+              <a:rPr lang="zh-TW" b="1" dirty="0"/>
               <a:t>a</a:t>
             </a:r>
             <a:r>
-              <a:rPr lang="en-US" altLang="zh-TW" b="1"/>
+              <a:rPr lang="en-US" altLang="zh-TW" b="1" dirty="0"/>
               <a:t>set</a:t>
             </a:r>
-            <a:endParaRPr lang="zh-TW" altLang="en-US" b="1"/>
+            <a:endParaRPr lang="zh-TW" altLang="en-US" b="1" dirty="0"/>
           </a:p>
           <a:p>
             <a:pPr marL="0" lvl="0" indent="0" algn="l" rtl="0">
@@ -14591,7 +14693,7 @@
               </a:spcAft>
               <a:buNone/>
             </a:pPr>
-            <a:endParaRPr/>
+            <a:endParaRPr dirty="0"/>
           </a:p>
           <a:p>
             <a:pPr>
@@ -14604,58 +14706,58 @@
               <a:buChar char="-"/>
             </a:pPr>
             <a:r>
-              <a:rPr lang="zh-TW" b="1"/>
+              <a:rPr lang="zh-TW" b="1" dirty="0"/>
               <a:t>Training</a:t>
             </a:r>
             <a:r>
-              <a:rPr lang="zh-TW"/>
+              <a:rPr lang="zh-TW" dirty="0"/>
               <a:t> AI w</a:t>
             </a:r>
             <a:r>
-              <a:rPr lang="en-US" altLang="zh-TW"/>
+              <a:rPr lang="en-US" altLang="zh-TW" dirty="0"/>
               <a:t>eight</a:t>
             </a:r>
             <a:r>
-              <a:rPr lang="zh-TW" altLang="en-US"/>
+              <a:rPr lang="zh-TW" altLang="en-US" dirty="0"/>
               <a:t> </a:t>
             </a:r>
             <a:r>
-              <a:rPr lang="en-US" altLang="zh-TW"/>
+              <a:rPr lang="en-US" altLang="zh-TW" dirty="0"/>
               <a:t>w</a:t>
             </a:r>
             <a:r>
-              <a:rPr lang="zh-TW"/>
+              <a:rPr lang="zh-TW" dirty="0"/>
               <a:t>ith </a:t>
             </a:r>
             <a:r>
-              <a:rPr lang="en-US" altLang="zh-TW"/>
+              <a:rPr lang="en-US" altLang="zh-TW" dirty="0"/>
               <a:t>customized</a:t>
             </a:r>
             <a:r>
-              <a:rPr lang="zh-TW" altLang="en-US"/>
+              <a:rPr lang="zh-TW" altLang="en-US" dirty="0"/>
               <a:t> d</a:t>
             </a:r>
             <a:r>
-              <a:rPr lang="zh-TW"/>
+              <a:rPr lang="zh-TW" dirty="0"/>
               <a:t>a</a:t>
             </a:r>
             <a:r>
-              <a:rPr lang="en-US" altLang="zh-TW"/>
+              <a:rPr lang="en-US" altLang="zh-TW" dirty="0"/>
               <a:t>t</a:t>
             </a:r>
             <a:r>
-              <a:rPr lang="zh-TW"/>
+              <a:rPr lang="zh-TW" dirty="0"/>
               <a:t>a</a:t>
             </a:r>
             <a:r>
-              <a:rPr lang="en-US" altLang="zh-TW"/>
+              <a:rPr lang="en-US" altLang="zh-TW" dirty="0"/>
               <a:t>set</a:t>
             </a:r>
             <a:r>
-              <a:rPr lang="zh-TW" altLang="en-US"/>
+              <a:rPr lang="zh-TW" altLang="en-US" dirty="0"/>
               <a:t> </a:t>
             </a:r>
-            <a:endParaRPr lang="zh-TW"/>
+            <a:endParaRPr lang="zh-TW" dirty="0"/>
           </a:p>
         </p:txBody>
       </p:sp>

</xml_diff>